<commit_message>
Aggiunta presentazione savazzi terminata, più presentazione Alex terminata, più loro merge
</commit_message>
<xml_diff>
--- a/Approfondimento - Security/Presentazione - Savazzi.pptx
+++ b/Approfondimento - Security/Presentazione - Savazzi.pptx
@@ -5,7 +5,7 @@
     <p:sldMasterId id="2147483648" r:id="rId1"/>
   </p:sldMasterIdLst>
   <p:notesMasterIdLst>
-    <p:notesMasterId r:id="rId10"/>
+    <p:notesMasterId r:id="rId12"/>
   </p:notesMasterIdLst>
   <p:sldIdLst>
     <p:sldId id="256" r:id="rId2"/>
@@ -15,7 +15,9 @@
     <p:sldId id="287" r:id="rId6"/>
     <p:sldId id="288" r:id="rId7"/>
     <p:sldId id="289" r:id="rId8"/>
-    <p:sldId id="282" r:id="rId9"/>
+    <p:sldId id="290" r:id="rId9"/>
+    <p:sldId id="291" r:id="rId10"/>
+    <p:sldId id="282" r:id="rId11"/>
   </p:sldIdLst>
   <p:sldSz cx="12192000" cy="6858000"/>
   <p:notesSz cx="6858000" cy="9144000"/>
@@ -131,7 +133,7 @@
       </p:ext>
     </p:extLst>
   </p:cmAuthor>
-  <p:cmAuthor id="2" name="Giacomo Savazzi" initials="GS" lastIdx="6" clrIdx="1">
+  <p:cmAuthor id="2" name="Giacomo Savazzi" initials="GS" lastIdx="7" clrIdx="1">
     <p:extLst>
       <p:ext uri="{19B8F6BF-5375-455C-9EA6-DF929625EA0E}">
         <p15:presenceInfo xmlns:p15="http://schemas.microsoft.com/office/powerpoint/2012/main" userId="S-1-5-21-417365229-399659180-1714775081-269543" providerId="AD"/>
@@ -146,6 +148,20 @@
     </p:extLst>
   </p:cmAuthor>
 </p:cmAuthorLst>
+</file>
+
+<file path=ppt/comments/comment1.xml><?xml version="1.0" encoding="utf-8"?>
+<p:cmLst xmlns:a="http://schemas.openxmlformats.org/drawingml/2006/main" xmlns:r="http://schemas.openxmlformats.org/officeDocument/2006/relationships" xmlns:p="http://schemas.openxmlformats.org/presentationml/2006/main">
+  <p:cm authorId="2" dt="2022-11-21T14:02:34.319" idx="7">
+    <p:pos x="10" y="10"/>
+    <p:text>Una volta che il sistema ha identificato, e in parte resistito ad un attacco, avrà bisogna di essere rifatto partire da una situazione consona con quella precedente all'attacco. In parte sarà necessario far ripartire il servizio, sfruttando server di backup per questo scopo. Visto che un attacco terminato con successo può essere visto come failure, si possono considerare le tattiche viste per il recover da failure. In più, si ha:</p:text>
+    <p:extLst>
+      <p:ext uri="{C676402C-5697-4E1C-873F-D02D1690AC5C}">
+        <p15:threadingInfo xmlns:p15="http://schemas.microsoft.com/office/powerpoint/2012/main" timeZoneBias="-60"/>
+      </p:ext>
+    </p:extLst>
+  </p:cm>
+</p:cmLst>
 </file>
 
 <file path=ppt/notesMasters/notesMaster1.xml><?xml version="1.0" encoding="utf-8"?>
@@ -230,7 +246,7 @@
           <a:p>
             <a:fld id="{B65E5A98-DA83-404B-AF61-44AE5342FB50}" type="datetimeFigureOut">
               <a:rPr lang="it-IT" smtClean="0"/>
-              <a:t>20/11/2022</a:t>
+              <a:t>21/11/2022</a:t>
             </a:fld>
             <a:endParaRPr lang="it-IT"/>
           </a:p>
@@ -644,7 +660,7 @@
           <a:p>
             <a:fld id="{9CD29C0B-695A-4D66-B8E9-5671F929A42B}" type="datetime1">
               <a:rPr lang="it-IT" smtClean="0"/>
-              <a:t>20/11/2022</a:t>
+              <a:t>21/11/2022</a:t>
             </a:fld>
             <a:endParaRPr lang="it-IT"/>
           </a:p>
@@ -842,7 +858,7 @@
           <a:p>
             <a:fld id="{AF0EC3E5-863F-4DFB-B3BC-1B55C7011BF9}" type="datetime1">
               <a:rPr lang="it-IT" smtClean="0"/>
-              <a:t>20/11/2022</a:t>
+              <a:t>21/11/2022</a:t>
             </a:fld>
             <a:endParaRPr lang="it-IT"/>
           </a:p>
@@ -1050,7 +1066,7 @@
           <a:p>
             <a:fld id="{DE4D602C-F8B6-42E8-BED7-016CDA0017F3}" type="datetime1">
               <a:rPr lang="it-IT" smtClean="0"/>
-              <a:t>20/11/2022</a:t>
+              <a:t>21/11/2022</a:t>
             </a:fld>
             <a:endParaRPr lang="it-IT"/>
           </a:p>
@@ -1248,7 +1264,7 @@
           <a:p>
             <a:fld id="{EDB10CE1-110C-4ED2-B55F-A302E1FD9F70}" type="datetime1">
               <a:rPr lang="it-IT" smtClean="0"/>
-              <a:t>20/11/2022</a:t>
+              <a:t>21/11/2022</a:t>
             </a:fld>
             <a:endParaRPr lang="it-IT"/>
           </a:p>
@@ -1523,7 +1539,7 @@
           <a:p>
             <a:fld id="{0F61B4B8-A1B7-42D4-A1E0-2645EDAC8BED}" type="datetime1">
               <a:rPr lang="it-IT" smtClean="0"/>
-              <a:t>20/11/2022</a:t>
+              <a:t>21/11/2022</a:t>
             </a:fld>
             <a:endParaRPr lang="it-IT"/>
           </a:p>
@@ -1788,7 +1804,7 @@
           <a:p>
             <a:fld id="{188DF4B9-859A-4780-A169-ED3A8349339B}" type="datetime1">
               <a:rPr lang="it-IT" smtClean="0"/>
-              <a:t>20/11/2022</a:t>
+              <a:t>21/11/2022</a:t>
             </a:fld>
             <a:endParaRPr lang="it-IT"/>
           </a:p>
@@ -2200,7 +2216,7 @@
           <a:p>
             <a:fld id="{24D45E2C-55DD-40A9-BF2D-48E7D2AB1ABA}" type="datetime1">
               <a:rPr lang="it-IT" smtClean="0"/>
-              <a:t>20/11/2022</a:t>
+              <a:t>21/11/2022</a:t>
             </a:fld>
             <a:endParaRPr lang="it-IT"/>
           </a:p>
@@ -2341,7 +2357,7 @@
           <a:p>
             <a:fld id="{DC20DFAC-47A9-47B0-8C05-A3316EEF3D0C}" type="datetime1">
               <a:rPr lang="it-IT" smtClean="0"/>
-              <a:t>20/11/2022</a:t>
+              <a:t>21/11/2022</a:t>
             </a:fld>
             <a:endParaRPr lang="it-IT"/>
           </a:p>
@@ -2454,7 +2470,7 @@
           <a:p>
             <a:fld id="{B48A923B-8423-475F-9DB1-11B37109C533}" type="datetime1">
               <a:rPr lang="it-IT" smtClean="0"/>
-              <a:t>20/11/2022</a:t>
+              <a:t>21/11/2022</a:t>
             </a:fld>
             <a:endParaRPr lang="it-IT"/>
           </a:p>
@@ -2765,7 +2781,7 @@
           <a:p>
             <a:fld id="{39A5E392-1A82-4114-9B1C-7507E099813A}" type="datetime1">
               <a:rPr lang="it-IT" smtClean="0"/>
-              <a:t>20/11/2022</a:t>
+              <a:t>21/11/2022</a:t>
             </a:fld>
             <a:endParaRPr lang="it-IT"/>
           </a:p>
@@ -3053,7 +3069,7 @@
           <a:p>
             <a:fld id="{3F1E08A9-9033-4FA7-A83A-B5FC89FF2B18}" type="datetime1">
               <a:rPr lang="it-IT" smtClean="0"/>
-              <a:t>20/11/2022</a:t>
+              <a:t>21/11/2022</a:t>
             </a:fld>
             <a:endParaRPr lang="it-IT"/>
           </a:p>
@@ -3294,7 +3310,7 @@
           <a:p>
             <a:fld id="{62F13085-FB8A-48A6-9A18-D32F849A60AC}" type="datetime1">
               <a:rPr lang="it-IT" smtClean="0"/>
-              <a:t>20/11/2022</a:t>
+              <a:t>21/11/2022</a:t>
             </a:fld>
             <a:endParaRPr lang="it-IT"/>
           </a:p>
@@ -4084,6 +4100,128 @@
 </p:sld>
 </file>
 
+<file path=ppt/slides/slide10.xml><?xml version="1.0" encoding="utf-8"?>
+<p:sld xmlns:a="http://schemas.openxmlformats.org/drawingml/2006/main" xmlns:r="http://schemas.openxmlformats.org/officeDocument/2006/relationships" xmlns:p="http://schemas.openxmlformats.org/presentationml/2006/main">
+  <p:cSld>
+    <p:spTree>
+      <p:nvGrpSpPr>
+        <p:cNvPr id="1" name=""/>
+        <p:cNvGrpSpPr/>
+        <p:nvPr/>
+      </p:nvGrpSpPr>
+      <p:grpSpPr>
+        <a:xfrm>
+          <a:off x="0" y="0"/>
+          <a:ext cx="0" cy="0"/>
+          <a:chOff x="0" y="0"/>
+          <a:chExt cx="0" cy="0"/>
+        </a:xfrm>
+      </p:grpSpPr>
+      <p:sp>
+        <p:nvSpPr>
+          <p:cNvPr id="4" name="Segnaposto numero diapositiva 3">
+            <a:extLst>
+              <a:ext uri="{FF2B5EF4-FFF2-40B4-BE49-F238E27FC236}">
+                <a16:creationId xmlns:a16="http://schemas.microsoft.com/office/drawing/2014/main" id="{91E057A0-BAB1-4D57-BDBD-F8F3DE02BEE1}"/>
+              </a:ext>
+            </a:extLst>
+          </p:cNvPr>
+          <p:cNvSpPr>
+            <a:spLocks noGrp="1"/>
+          </p:cNvSpPr>
+          <p:nvPr>
+            <p:ph type="sldNum" sz="quarter" idx="12"/>
+          </p:nvPr>
+        </p:nvSpPr>
+        <p:spPr/>
+        <p:txBody>
+          <a:bodyPr/>
+          <a:lstStyle/>
+          <a:p>
+            <a:fld id="{AFB85319-5DF8-4B17-9881-6D5B2C7AB305}" type="slidenum">
+              <a:rPr lang="it-IT" smtClean="0"/>
+              <a:t>10</a:t>
+            </a:fld>
+            <a:endParaRPr lang="it-IT" dirty="0"/>
+          </a:p>
+        </p:txBody>
+      </p:sp>
+      <p:sp>
+        <p:nvSpPr>
+          <p:cNvPr id="7" name="Rectangle 9">
+            <a:extLst>
+              <a:ext uri="{FF2B5EF4-FFF2-40B4-BE49-F238E27FC236}">
+                <a16:creationId xmlns:a16="http://schemas.microsoft.com/office/drawing/2014/main" id="{CF7B5ACB-35EA-4058-827D-167D3165D90F}"/>
+              </a:ext>
+            </a:extLst>
+          </p:cNvPr>
+          <p:cNvSpPr/>
+          <p:nvPr/>
+        </p:nvSpPr>
+        <p:spPr>
+          <a:xfrm>
+            <a:off x="1743075" y="1751617"/>
+            <a:ext cx="8705850" cy="3354765"/>
+          </a:xfrm>
+          <a:prstGeom prst="rect">
+            <a:avLst/>
+          </a:prstGeom>
+        </p:spPr>
+        <p:txBody>
+          <a:bodyPr wrap="square">
+            <a:spAutoFit/>
+          </a:bodyPr>
+          <a:lstStyle/>
+          <a:p>
+            <a:pPr algn="ctr"/>
+            <a:r>
+              <a:rPr lang="it-IT" sz="9600" dirty="0">
+                <a:solidFill>
+                  <a:srgbClr val="002060"/>
+                </a:solidFill>
+              </a:rPr>
+              <a:t>Thanks for Your </a:t>
+            </a:r>
+            <a:r>
+              <a:rPr lang="it-IT" sz="9600" dirty="0" err="1">
+                <a:solidFill>
+                  <a:srgbClr val="002060"/>
+                </a:solidFill>
+              </a:rPr>
+              <a:t>Attention</a:t>
+            </a:r>
+            <a:endParaRPr lang="it-IT" sz="9600" dirty="0">
+              <a:solidFill>
+                <a:srgbClr val="002060"/>
+              </a:solidFill>
+            </a:endParaRPr>
+          </a:p>
+          <a:p>
+            <a:pPr marL="342900" indent="-342900" algn="just">
+              <a:buFont typeface="Arial" panose="020B0604020202020204" pitchFamily="34" charset="0"/>
+              <a:buChar char="•"/>
+            </a:pPr>
+            <a:endParaRPr lang="it-IT" sz="2000" i="1" dirty="0">
+              <a:solidFill>
+                <a:srgbClr val="002060"/>
+              </a:solidFill>
+            </a:endParaRPr>
+          </a:p>
+        </p:txBody>
+      </p:sp>
+    </p:spTree>
+    <p:extLst>
+      <p:ext uri="{BB962C8B-B14F-4D97-AF65-F5344CB8AC3E}">
+        <p14:creationId xmlns:p14="http://schemas.microsoft.com/office/powerpoint/2010/main" val="603346053"/>
+      </p:ext>
+    </p:extLst>
+  </p:cSld>
+  <p:clrMapOvr>
+    <a:masterClrMapping/>
+  </p:clrMapOvr>
+</p:sld>
+</file>
+
 <file path=ppt/slides/slide2.xml><?xml version="1.0" encoding="utf-8"?>
 <p:sld xmlns:a="http://schemas.openxmlformats.org/drawingml/2006/main" xmlns:r="http://schemas.openxmlformats.org/officeDocument/2006/relationships" xmlns:p="http://schemas.openxmlformats.org/presentationml/2006/main">
   <p:cSld>
@@ -4955,7 +5093,7 @@
               <a:buChar char="•"/>
             </a:pPr>
             <a:r>
-              <a:rPr lang="en-US" sz="2800" i="1" dirty="0">
+              <a:rPr lang="en-US" sz="2800" b="1" i="1" dirty="0">
                 <a:ln w="0"/>
                 <a:solidFill>
                   <a:srgbClr val="002060"/>
@@ -4968,14 +5106,8 @@
                   </a:outerShdw>
                 </a:effectLst>
               </a:rPr>
-              <a:t>Limited access (e.g., fences and security checkpoint);</a:t>
-            </a:r>
-          </a:p>
-          <a:p>
-            <a:pPr marL="457200" indent="-457200" algn="just">
-              <a:buFont typeface="Arial" panose="020B0604020202020204" pitchFamily="34" charset="0"/>
-              <a:buChar char="•"/>
-            </a:pPr>
+              <a:t>Limited access </a:t>
+            </a:r>
             <a:r>
               <a:rPr lang="en-US" sz="2800" i="1" dirty="0">
                 <a:ln w="0"/>
@@ -4990,7 +5122,7 @@
                   </a:outerShdw>
                 </a:effectLst>
               </a:rPr>
-              <a:t>Detecting intruders (e.g., visitors with badges);</a:t>
+              <a:t>(e.g., fences and security checkpoint);</a:t>
             </a:r>
           </a:p>
           <a:p>
@@ -4999,7 +5131,7 @@
               <a:buChar char="•"/>
             </a:pPr>
             <a:r>
-              <a:rPr lang="en-US" sz="2800" i="1" dirty="0">
+              <a:rPr lang="en-US" sz="2800" b="1" i="1" dirty="0">
                 <a:ln w="0"/>
                 <a:solidFill>
                   <a:srgbClr val="002060"/>
@@ -5012,14 +5144,8 @@
                   </a:outerShdw>
                 </a:effectLst>
               </a:rPr>
-              <a:t>Deterrence mechanisms (e.g., armed guards);</a:t>
-            </a:r>
-          </a:p>
-          <a:p>
-            <a:pPr marL="457200" indent="-457200" algn="just">
-              <a:buFont typeface="Arial" panose="020B0604020202020204" pitchFamily="34" charset="0"/>
-              <a:buChar char="•"/>
-            </a:pPr>
+              <a:t>Detecting intruders </a:t>
+            </a:r>
             <a:r>
               <a:rPr lang="en-US" sz="2800" i="1" dirty="0">
                 <a:ln w="0"/>
@@ -5034,7 +5160,7 @@
                   </a:outerShdw>
                 </a:effectLst>
               </a:rPr>
-              <a:t>Reaction mechanisms (e.g., doors automatic lock, acoustic alarm);</a:t>
+              <a:t>(e.g., visitors with badges);</a:t>
             </a:r>
           </a:p>
           <a:p>
@@ -5043,7 +5169,7 @@
               <a:buChar char="•"/>
             </a:pPr>
             <a:r>
-              <a:rPr lang="en-US" sz="2800" i="1" dirty="0">
+              <a:rPr lang="en-US" sz="2800" b="1" i="1" dirty="0">
                 <a:ln w="0"/>
                 <a:solidFill>
                   <a:srgbClr val="002060"/>
@@ -5056,7 +5182,99 @@
                   </a:outerShdw>
                 </a:effectLst>
               </a:rPr>
-              <a:t>Recovery mechanisms (e.g., off-site backup);</a:t>
+              <a:t>Deterrence mechanisms </a:t>
+            </a:r>
+            <a:r>
+              <a:rPr lang="en-US" sz="2800" i="1" dirty="0">
+                <a:ln w="0"/>
+                <a:solidFill>
+                  <a:srgbClr val="002060"/>
+                </a:solidFill>
+                <a:effectLst>
+                  <a:outerShdw blurRad="38100" dist="25400" dir="5400000" algn="ctr" rotWithShape="0">
+                    <a:srgbClr val="6E747A">
+                      <a:alpha val="43000"/>
+                    </a:srgbClr>
+                  </a:outerShdw>
+                </a:effectLst>
+              </a:rPr>
+              <a:t>(e.g., armed guards);</a:t>
+            </a:r>
+          </a:p>
+          <a:p>
+            <a:pPr marL="457200" indent="-457200" algn="just">
+              <a:buFont typeface="Arial" panose="020B0604020202020204" pitchFamily="34" charset="0"/>
+              <a:buChar char="•"/>
+            </a:pPr>
+            <a:r>
+              <a:rPr lang="en-US" sz="2800" b="1" i="1" dirty="0">
+                <a:ln w="0"/>
+                <a:solidFill>
+                  <a:srgbClr val="002060"/>
+                </a:solidFill>
+                <a:effectLst>
+                  <a:outerShdw blurRad="38100" dist="25400" dir="5400000" algn="ctr" rotWithShape="0">
+                    <a:srgbClr val="6E747A">
+                      <a:alpha val="43000"/>
+                    </a:srgbClr>
+                  </a:outerShdw>
+                </a:effectLst>
+              </a:rPr>
+              <a:t>Reaction mechanisms </a:t>
+            </a:r>
+            <a:r>
+              <a:rPr lang="en-US" sz="2800" i="1" dirty="0">
+                <a:ln w="0"/>
+                <a:solidFill>
+                  <a:srgbClr val="002060"/>
+                </a:solidFill>
+                <a:effectLst>
+                  <a:outerShdw blurRad="38100" dist="25400" dir="5400000" algn="ctr" rotWithShape="0">
+                    <a:srgbClr val="6E747A">
+                      <a:alpha val="43000"/>
+                    </a:srgbClr>
+                  </a:outerShdw>
+                </a:effectLst>
+              </a:rPr>
+              <a:t>(e.g., doors automatic lock, acoustic alarm);</a:t>
+            </a:r>
+          </a:p>
+          <a:p>
+            <a:pPr marL="457200" indent="-457200" algn="just">
+              <a:buFont typeface="Arial" panose="020B0604020202020204" pitchFamily="34" charset="0"/>
+              <a:buChar char="•"/>
+            </a:pPr>
+            <a:r>
+              <a:rPr lang="en-US" sz="2800" b="1" i="1" dirty="0">
+                <a:ln w="0"/>
+                <a:solidFill>
+                  <a:srgbClr val="002060"/>
+                </a:solidFill>
+                <a:effectLst>
+                  <a:outerShdw blurRad="38100" dist="25400" dir="5400000" algn="ctr" rotWithShape="0">
+                    <a:srgbClr val="6E747A">
+                      <a:alpha val="43000"/>
+                    </a:srgbClr>
+                  </a:outerShdw>
+                </a:effectLst>
+              </a:rPr>
+              <a:t>Recovery mechanisms </a:t>
+            </a:r>
+            <a:r>
+              <a:rPr lang="en-US" sz="2800" i="1" dirty="0">
+                <a:ln w="0"/>
+                <a:solidFill>
+                  <a:srgbClr val="002060"/>
+                </a:solidFill>
+                <a:effectLst>
+                  <a:outerShdw blurRad="38100" dist="25400" dir="5400000" algn="ctr" rotWithShape="0">
+                    <a:srgbClr val="6E747A">
+                      <a:alpha val="43000"/>
+                    </a:srgbClr>
+                  </a:outerShdw>
+                </a:effectLst>
+              </a:rPr>
+              <a:t>(e.g., off-site backup);</a:t>
             </a:r>
           </a:p>
         </p:txBody>
@@ -5251,42 +5469,6 @@
           </a:extLst>
         </p:spPr>
       </p:pic>
-      <p:pic>
-        <p:nvPicPr>
-          <p:cNvPr id="3" name="Picture 2">
-            <a:extLst>
-              <a:ext uri="{FF2B5EF4-FFF2-40B4-BE49-F238E27FC236}">
-                <a16:creationId xmlns:a16="http://schemas.microsoft.com/office/drawing/2014/main" id="{9A4A009E-89A8-46FF-BAE2-A83329979347}"/>
-              </a:ext>
-            </a:extLst>
-          </p:cNvPr>
-          <p:cNvPicPr>
-            <a:picLocks noChangeAspect="1"/>
-          </p:cNvPicPr>
-          <p:nvPr/>
-        </p:nvPicPr>
-        <p:blipFill>
-          <a:blip r:embed="rId4">
-            <a:extLst>
-              <a:ext uri="{28A0092B-C50C-407E-A947-70E740481C1C}">
-                <a14:useLocalDpi xmlns:a14="http://schemas.microsoft.com/office/drawing/2010/main" val="0"/>
-              </a:ext>
-            </a:extLst>
-          </a:blip>
-          <a:stretch>
-            <a:fillRect/>
-          </a:stretch>
-        </p:blipFill>
-        <p:spPr>
-          <a:xfrm>
-            <a:off x="326710" y="1728425"/>
-            <a:ext cx="5673890" cy="4796329"/>
-          </a:xfrm>
-          <a:prstGeom prst="rect">
-            <a:avLst/>
-          </a:prstGeom>
-        </p:spPr>
-      </p:pic>
       <p:sp>
         <p:nvSpPr>
           <p:cNvPr id="12" name="CasellaDiTesto 11">
@@ -5301,8 +5483,8 @@
         </p:nvSpPr>
         <p:spPr>
           <a:xfrm>
-            <a:off x="6191402" y="2787761"/>
-            <a:ext cx="5673890" cy="2677656"/>
+            <a:off x="214721" y="5109349"/>
+            <a:ext cx="5673890" cy="1015663"/>
           </a:xfrm>
           <a:prstGeom prst="rect">
             <a:avLst/>
@@ -5320,7 +5502,7 @@
               <a:buChar char="•"/>
             </a:pPr>
             <a:r>
-              <a:rPr lang="en-US" sz="2400" b="1" i="1" dirty="0">
+              <a:rPr lang="en-US" sz="2000" b="1" i="1" dirty="0">
                 <a:ln w="0"/>
                 <a:solidFill>
                   <a:srgbClr val="002060"/>
@@ -5336,7 +5518,7 @@
               <a:t>Detect Attacks</a:t>
             </a:r>
             <a:r>
-              <a:rPr lang="en-US" sz="2400" i="1" dirty="0">
+              <a:rPr lang="en-US" sz="2000" i="1" dirty="0">
                 <a:ln w="0"/>
                 <a:solidFill>
                   <a:srgbClr val="002060"/>
@@ -5349,7 +5531,7 @@
                   </a:outerShdw>
                 </a:effectLst>
               </a:rPr>
-              <a:t>: identify an attack before it takes effect;</a:t>
+              <a:t>: identify attacks before it takes effect;</a:t>
             </a:r>
           </a:p>
           <a:p>
@@ -5358,7 +5540,7 @@
               <a:buChar char="•"/>
             </a:pPr>
             <a:r>
-              <a:rPr lang="en-US" sz="2400" b="1" i="1" dirty="0">
+              <a:rPr lang="en-US" sz="2000" b="1" i="1" dirty="0">
                 <a:ln w="0"/>
                 <a:solidFill>
                   <a:srgbClr val="002060"/>
@@ -5374,7 +5556,7 @@
               <a:t>Resist Attacks</a:t>
             </a:r>
             <a:r>
-              <a:rPr lang="en-US" sz="2400" i="1" dirty="0">
+              <a:rPr lang="en-US" sz="2000" i="1" dirty="0">
                 <a:ln w="0"/>
                 <a:solidFill>
                   <a:srgbClr val="002060"/>
@@ -5390,13 +5572,77 @@
               <a:t>: prevent possible attack;</a:t>
             </a:r>
           </a:p>
+        </p:txBody>
+      </p:sp>
+      <p:pic>
+        <p:nvPicPr>
+          <p:cNvPr id="5" name="Picture 4">
+            <a:extLst>
+              <a:ext uri="{FF2B5EF4-FFF2-40B4-BE49-F238E27FC236}">
+                <a16:creationId xmlns:a16="http://schemas.microsoft.com/office/drawing/2014/main" id="{907A6155-6D93-480B-8D9F-132A0B663C46}"/>
+              </a:ext>
+            </a:extLst>
+          </p:cNvPr>
+          <p:cNvPicPr>
+            <a:picLocks noChangeAspect="1"/>
+          </p:cNvPicPr>
+          <p:nvPr/>
+        </p:nvPicPr>
+        <p:blipFill>
+          <a:blip r:embed="rId4">
+            <a:extLst>
+              <a:ext uri="{28A0092B-C50C-407E-A947-70E740481C1C}">
+                <a14:useLocalDpi xmlns:a14="http://schemas.microsoft.com/office/drawing/2010/main" val="0"/>
+              </a:ext>
+            </a:extLst>
+          </a:blip>
+          <a:stretch>
+            <a:fillRect/>
+          </a:stretch>
+        </p:blipFill>
+        <p:spPr>
+          <a:xfrm>
+            <a:off x="1972091" y="1663129"/>
+            <a:ext cx="7833040" cy="3295036"/>
+          </a:xfrm>
+          <a:prstGeom prst="rect">
+            <a:avLst/>
+          </a:prstGeom>
+        </p:spPr>
+      </p:pic>
+      <p:sp>
+        <p:nvSpPr>
+          <p:cNvPr id="7" name="Rectangle 6">
+            <a:extLst>
+              <a:ext uri="{FF2B5EF4-FFF2-40B4-BE49-F238E27FC236}">
+                <a16:creationId xmlns:a16="http://schemas.microsoft.com/office/drawing/2014/main" id="{FAA8C0C9-7D7D-49EC-B03B-5079723AC9D0}"/>
+              </a:ext>
+            </a:extLst>
+          </p:cNvPr>
+          <p:cNvSpPr/>
+          <p:nvPr/>
+        </p:nvSpPr>
+        <p:spPr>
+          <a:xfrm>
+            <a:off x="6000599" y="5109349"/>
+            <a:ext cx="6096000" cy="1015663"/>
+          </a:xfrm>
+          <a:prstGeom prst="rect">
+            <a:avLst/>
+          </a:prstGeom>
+        </p:spPr>
+        <p:txBody>
+          <a:bodyPr>
+            <a:spAutoFit/>
+          </a:bodyPr>
+          <a:lstStyle/>
           <a:p>
             <a:pPr marL="457200" indent="-457200" algn="just">
               <a:buFont typeface="Arial" panose="020B0604020202020204" pitchFamily="34" charset="0"/>
               <a:buChar char="•"/>
             </a:pPr>
             <a:r>
-              <a:rPr lang="en-US" sz="2400" b="1" i="1" dirty="0">
+              <a:rPr lang="en-US" sz="2000" b="1" i="1" dirty="0">
                 <a:ln w="0"/>
                 <a:solidFill>
                   <a:srgbClr val="002060"/>
@@ -5412,7 +5658,7 @@
               <a:t>React to Attacks</a:t>
             </a:r>
             <a:r>
-              <a:rPr lang="en-US" sz="2400" i="1" dirty="0">
+              <a:rPr lang="en-US" sz="2000" i="1" dirty="0">
                 <a:ln w="0"/>
                 <a:solidFill>
                   <a:srgbClr val="002060"/>
@@ -5434,7 +5680,7 @@
               <a:buChar char="•"/>
             </a:pPr>
             <a:r>
-              <a:rPr lang="en-US" sz="2400" b="1" i="1" dirty="0">
+              <a:rPr lang="en-US" sz="2000" b="1" i="1" dirty="0">
                 <a:ln w="0"/>
                 <a:solidFill>
                   <a:srgbClr val="002060"/>
@@ -5447,10 +5693,10 @@
                   </a:outerShdw>
                 </a:effectLst>
               </a:rPr>
-              <a:t>Recover for Attacks</a:t>
-            </a:r>
-            <a:r>
-              <a:rPr lang="en-US" sz="2400" i="1" dirty="0">
+              <a:t>Recover from Attacks</a:t>
+            </a:r>
+            <a:r>
+              <a:rPr lang="en-US" sz="2000" i="1" dirty="0">
                 <a:ln w="0"/>
                 <a:solidFill>
                   <a:srgbClr val="002060"/>
@@ -5463,7 +5709,7 @@
                   </a:outerShdw>
                 </a:effectLst>
               </a:rPr>
-              <a:t>: restore system after a successful attack;</a:t>
+              <a:t>: restore system successful attacks;</a:t>
             </a:r>
           </a:p>
         </p:txBody>
@@ -5728,8 +5974,8 @@
         </p:blipFill>
         <p:spPr>
           <a:xfrm>
-            <a:off x="4791381" y="4041483"/>
-            <a:ext cx="2609238" cy="2609238"/>
+            <a:off x="5074722" y="4678919"/>
+            <a:ext cx="2042556" cy="2042556"/>
           </a:xfrm>
           <a:prstGeom prst="rect">
             <a:avLst/>
@@ -5750,8 +5996,8 @@
         </p:nvSpPr>
         <p:spPr>
           <a:xfrm>
-            <a:off x="1066801" y="2032102"/>
-            <a:ext cx="10058399" cy="1938992"/>
+            <a:off x="1066801" y="1663134"/>
+            <a:ext cx="10058399" cy="3046988"/>
           </a:xfrm>
           <a:prstGeom prst="rect">
             <a:avLst/>
@@ -5837,6 +6083,44 @@
                 </a:effectLst>
               </a:rPr>
               <a:t>: using of techniques, like checksum or hash value, to verify the integrity of messages, resource file, configuration files etc.;</a:t>
+            </a:r>
+          </a:p>
+          <a:p>
+            <a:pPr marL="457200" indent="-457200" algn="just">
+              <a:buFont typeface="Arial" panose="020B0604020202020204" pitchFamily="34" charset="0"/>
+              <a:buChar char="•"/>
+            </a:pPr>
+            <a:r>
+              <a:rPr lang="en-US" sz="2400" b="1" i="1" dirty="0">
+                <a:ln w="0"/>
+                <a:solidFill>
+                  <a:srgbClr val="002060"/>
+                </a:solidFill>
+                <a:effectLst>
+                  <a:outerShdw blurRad="38100" dist="25400" dir="5400000" algn="ctr" rotWithShape="0">
+                    <a:srgbClr val="6E747A">
+                      <a:alpha val="43000"/>
+                    </a:srgbClr>
+                  </a:outerShdw>
+                </a:effectLst>
+              </a:rPr>
+              <a:t>Detect message delivery anomalies</a:t>
+            </a:r>
+            <a:r>
+              <a:rPr lang="en-US" sz="2400" i="1" dirty="0">
+                <a:ln w="0"/>
+                <a:solidFill>
+                  <a:srgbClr val="002060"/>
+                </a:solidFill>
+                <a:effectLst>
+                  <a:outerShdw blurRad="38100" dist="25400" dir="5400000" algn="ctr" rotWithShape="0">
+                    <a:srgbClr val="6E747A">
+                      <a:alpha val="43000"/>
+                    </a:srgbClr>
+                  </a:outerShdw>
+                </a:effectLst>
+              </a:rPr>
+              <a:t>: detect potential man-in-the-middle attack. Can be indicated by too long time for sending or receiving, or abnormal number of connection and disconnecting during communication;</a:t>
             </a:r>
           </a:p>
         </p:txBody>
@@ -6275,77 +6559,713 @@
               <a:rPr lang="it-IT" smtClean="0"/>
               <a:t>8</a:t>
             </a:fld>
-            <a:endParaRPr lang="it-IT" dirty="0"/>
-          </a:p>
-        </p:txBody>
-      </p:sp>
-      <p:sp>
-        <p:nvSpPr>
-          <p:cNvPr id="7" name="Rectangle 9">
-            <a:extLst>
-              <a:ext uri="{FF2B5EF4-FFF2-40B4-BE49-F238E27FC236}">
-                <a16:creationId xmlns:a16="http://schemas.microsoft.com/office/drawing/2014/main" id="{CF7B5ACB-35EA-4058-827D-167D3165D90F}"/>
-              </a:ext>
-            </a:extLst>
-          </p:cNvPr>
-          <p:cNvSpPr/>
+            <a:endParaRPr lang="it-IT"/>
+          </a:p>
+        </p:txBody>
+      </p:sp>
+      <p:pic>
+        <p:nvPicPr>
+          <p:cNvPr id="6" name="Immagine 5">
+            <a:extLst>
+              <a:ext uri="{FF2B5EF4-FFF2-40B4-BE49-F238E27FC236}">
+                <a16:creationId xmlns:a16="http://schemas.microsoft.com/office/drawing/2014/main" id="{64DD2710-C925-4AEB-B772-6D532D848EB4}"/>
+              </a:ext>
+            </a:extLst>
+          </p:cNvPr>
+          <p:cNvPicPr>
+            <a:picLocks noChangeAspect="1"/>
+          </p:cNvPicPr>
           <p:nvPr/>
-        </p:nvSpPr>
+        </p:nvPicPr>
+        <p:blipFill rotWithShape="1">
+          <a:blip r:embed="rId2"/>
+          <a:srcRect l="5289" t="10969" r="1423" b="12551"/>
+          <a:stretch/>
+        </p:blipFill>
         <p:spPr>
           <a:xfrm>
-            <a:off x="1743075" y="1751617"/>
-            <a:ext cx="8705850" cy="3354765"/>
+            <a:off x="1066800" y="136525"/>
+            <a:ext cx="10058400" cy="1295266"/>
           </a:xfrm>
           <a:prstGeom prst="rect">
             <a:avLst/>
           </a:prstGeom>
         </p:spPr>
-        <p:txBody>
-          <a:bodyPr wrap="square">
+      </p:pic>
+      <p:sp>
+        <p:nvSpPr>
+          <p:cNvPr id="8" name="CasellaDiTesto 7">
+            <a:extLst>
+              <a:ext uri="{FF2B5EF4-FFF2-40B4-BE49-F238E27FC236}">
+                <a16:creationId xmlns:a16="http://schemas.microsoft.com/office/drawing/2014/main" id="{3E0E40B7-DD25-4779-A260-DCF2A62C4B41}"/>
+              </a:ext>
+            </a:extLst>
+          </p:cNvPr>
+          <p:cNvSpPr txBox="1"/>
+          <p:nvPr/>
+        </p:nvSpPr>
+        <p:spPr>
+          <a:xfrm>
+            <a:off x="2413592" y="677393"/>
+            <a:ext cx="6657143" cy="584775"/>
+          </a:xfrm>
+          <a:prstGeom prst="rect">
+            <a:avLst/>
+          </a:prstGeom>
+          <a:noFill/>
+        </p:spPr>
+        <p:txBody>
+          <a:bodyPr wrap="none" rtlCol="0">
             <a:spAutoFit/>
           </a:bodyPr>
-          <a:lstStyle/>
-          <a:p>
-            <a:pPr algn="ctr"/>
-            <a:r>
-              <a:rPr lang="it-IT" sz="9600" dirty="0">
+          <a:lstStyle>
+            <a:defPPr>
+              <a:defRPr lang="it-IT"/>
+            </a:defPPr>
+            <a:lvl1pPr>
+              <a:defRPr sz="4800">
+                <a:ln w="0"/>
                 <a:solidFill>
                   <a:srgbClr val="002060"/>
                 </a:solidFill>
-              </a:rPr>
-              <a:t>Thanks for Your </a:t>
-            </a:r>
-            <a:r>
-              <a:rPr lang="it-IT" sz="9600" dirty="0" err="1">
-                <a:solidFill>
-                  <a:srgbClr val="002060"/>
-                </a:solidFill>
-              </a:rPr>
-              <a:t>Attention</a:t>
-            </a:r>
-            <a:endParaRPr lang="it-IT" sz="9600" dirty="0">
+                <a:effectLst>
+                  <a:outerShdw blurRad="38100" dist="25400" dir="5400000" algn="ctr" rotWithShape="0">
+                    <a:srgbClr val="6E747A">
+                      <a:alpha val="43000"/>
+                    </a:srgbClr>
+                  </a:outerShdw>
+                </a:effectLst>
+              </a:defRPr>
+            </a:lvl1pPr>
+          </a:lstStyle>
+          <a:p>
+            <a:r>
+              <a:rPr lang="en-US" sz="3200" i="1" dirty="0"/>
+              <a:t>Categories of Tactics – React to Attacks</a:t>
+            </a:r>
+            <a:endParaRPr lang="it-IT" sz="3200" i="1" dirty="0"/>
+          </a:p>
+        </p:txBody>
+      </p:sp>
+      <p:pic>
+        <p:nvPicPr>
+          <p:cNvPr id="9" name="Picture 2" descr="Università degli Studi di Milano-Bicocca - Wikipedia">
+            <a:extLst>
+              <a:ext uri="{FF2B5EF4-FFF2-40B4-BE49-F238E27FC236}">
+                <a16:creationId xmlns:a16="http://schemas.microsoft.com/office/drawing/2014/main" id="{9D1896BC-6EF3-43D9-B8A2-217137CA9550}"/>
+              </a:ext>
+            </a:extLst>
+          </p:cNvPr>
+          <p:cNvPicPr>
+            <a:picLocks noChangeAspect="1" noChangeArrowheads="1"/>
+          </p:cNvPicPr>
+          <p:nvPr/>
+        </p:nvPicPr>
+        <p:blipFill>
+          <a:blip r:embed="rId3">
+            <a:extLst>
+              <a:ext uri="{28A0092B-C50C-407E-A947-70E740481C1C}">
+                <a14:useLocalDpi xmlns:a14="http://schemas.microsoft.com/office/drawing/2010/main" val="0"/>
+              </a:ext>
+            </a:extLst>
+          </a:blip>
+          <a:srcRect/>
+          <a:stretch>
+            <a:fillRect/>
+          </a:stretch>
+        </p:blipFill>
+        <p:spPr bwMode="auto">
+          <a:xfrm>
+            <a:off x="1066800" y="160156"/>
+            <a:ext cx="1346792" cy="1331078"/>
+          </a:xfrm>
+          <a:prstGeom prst="rect">
+            <a:avLst/>
+          </a:prstGeom>
+          <a:noFill/>
+          <a:extLst>
+            <a:ext uri="{909E8E84-426E-40DD-AFC4-6F175D3DCCD1}">
+              <a14:hiddenFill xmlns:a14="http://schemas.microsoft.com/office/drawing/2010/main">
+                <a:solidFill>
+                  <a:srgbClr val="FFFFFF"/>
+                </a:solidFill>
+              </a14:hiddenFill>
+            </a:ext>
+          </a:extLst>
+        </p:spPr>
+      </p:pic>
+      <p:sp>
+        <p:nvSpPr>
+          <p:cNvPr id="12" name="CasellaDiTesto 11">
+            <a:extLst>
+              <a:ext uri="{FF2B5EF4-FFF2-40B4-BE49-F238E27FC236}">
+                <a16:creationId xmlns:a16="http://schemas.microsoft.com/office/drawing/2014/main" id="{571AD994-D4E1-4A5F-AC61-FAE189DB693F}"/>
+              </a:ext>
+            </a:extLst>
+          </p:cNvPr>
+          <p:cNvSpPr txBox="1"/>
+          <p:nvPr/>
+        </p:nvSpPr>
+        <p:spPr>
+          <a:xfrm>
+            <a:off x="683925" y="2555242"/>
+            <a:ext cx="5673890" cy="461665"/>
+          </a:xfrm>
+          <a:prstGeom prst="rect">
+            <a:avLst/>
+          </a:prstGeom>
+          <a:noFill/>
+        </p:spPr>
+        <p:txBody>
+          <a:bodyPr wrap="square" rtlCol="0">
+            <a:spAutoFit/>
+          </a:bodyPr>
+          <a:lstStyle/>
+          <a:p>
+            <a:pPr marL="457200" indent="-457200" algn="just">
+              <a:buFont typeface="Arial" panose="020B0604020202020204" pitchFamily="34" charset="0"/>
+              <a:buChar char="•"/>
+            </a:pPr>
+            <a:endParaRPr lang="en-US" sz="2400" i="1" dirty="0">
+              <a:ln w="0"/>
               <a:solidFill>
                 <a:srgbClr val="002060"/>
               </a:solidFill>
+              <a:effectLst>
+                <a:outerShdw blurRad="38100" dist="25400" dir="5400000" algn="ctr" rotWithShape="0">
+                  <a:srgbClr val="6E747A">
+                    <a:alpha val="43000"/>
+                  </a:srgbClr>
+                </a:outerShdw>
+              </a:effectLst>
             </a:endParaRPr>
           </a:p>
-          <a:p>
-            <a:pPr marL="342900" indent="-342900" algn="just">
+        </p:txBody>
+      </p:sp>
+      <p:sp>
+        <p:nvSpPr>
+          <p:cNvPr id="10" name="CasellaDiTesto 11">
+            <a:extLst>
+              <a:ext uri="{FF2B5EF4-FFF2-40B4-BE49-F238E27FC236}">
+                <a16:creationId xmlns:a16="http://schemas.microsoft.com/office/drawing/2014/main" id="{3C86721B-FE1B-4CA9-ADAF-445A69630E19}"/>
+              </a:ext>
+            </a:extLst>
+          </p:cNvPr>
+          <p:cNvSpPr txBox="1"/>
+          <p:nvPr/>
+        </p:nvSpPr>
+        <p:spPr>
+          <a:xfrm>
+            <a:off x="1066801" y="1653933"/>
+            <a:ext cx="10058399" cy="2677656"/>
+          </a:xfrm>
+          <a:prstGeom prst="rect">
+            <a:avLst/>
+          </a:prstGeom>
+          <a:noFill/>
+        </p:spPr>
+        <p:txBody>
+          <a:bodyPr wrap="square" rtlCol="0">
+            <a:spAutoFit/>
+          </a:bodyPr>
+          <a:lstStyle/>
+          <a:p>
+            <a:pPr marL="457200" indent="-457200" algn="just">
               <a:buFont typeface="Arial" panose="020B0604020202020204" pitchFamily="34" charset="0"/>
               <a:buChar char="•"/>
             </a:pPr>
-            <a:endParaRPr lang="it-IT" sz="2000" i="1" dirty="0">
+            <a:r>
+              <a:rPr lang="en-US" sz="2400" b="1" i="1" dirty="0">
+                <a:ln w="0"/>
+                <a:solidFill>
+                  <a:srgbClr val="002060"/>
+                </a:solidFill>
+                <a:effectLst>
+                  <a:outerShdw blurRad="38100" dist="25400" dir="5400000" algn="ctr" rotWithShape="0">
+                    <a:srgbClr val="6E747A">
+                      <a:alpha val="43000"/>
+                    </a:srgbClr>
+                  </a:outerShdw>
+                </a:effectLst>
+              </a:rPr>
+              <a:t>Revoke Access</a:t>
+            </a:r>
+            <a:r>
+              <a:rPr lang="en-US" sz="2400" i="1" dirty="0">
+                <a:ln w="0"/>
+                <a:solidFill>
+                  <a:srgbClr val="002060"/>
+                </a:solidFill>
+                <a:effectLst>
+                  <a:outerShdw blurRad="38100" dist="25400" dir="5400000" algn="ctr" rotWithShape="0">
+                    <a:srgbClr val="6E747A">
+                      <a:alpha val="43000"/>
+                    </a:srgbClr>
+                  </a:outerShdw>
+                </a:effectLst>
+              </a:rPr>
+              <a:t>: if the system notice that an attack is under way, access can be limited for sensitive resources, even for legitimate users, until the attack was not interrupted;</a:t>
+            </a:r>
+          </a:p>
+          <a:p>
+            <a:pPr marL="457200" indent="-457200" algn="just">
+              <a:buFont typeface="Arial" panose="020B0604020202020204" pitchFamily="34" charset="0"/>
+              <a:buChar char="•"/>
+            </a:pPr>
+            <a:r>
+              <a:rPr lang="en-US" sz="2400" b="1" i="1" dirty="0">
+                <a:ln w="0"/>
+                <a:solidFill>
+                  <a:srgbClr val="002060"/>
+                </a:solidFill>
+                <a:effectLst>
+                  <a:outerShdw blurRad="38100" dist="25400" dir="5400000" algn="ctr" rotWithShape="0">
+                    <a:srgbClr val="6E747A">
+                      <a:alpha val="43000"/>
+                    </a:srgbClr>
+                  </a:outerShdw>
+                </a:effectLst>
+              </a:rPr>
+              <a:t>Restrict Login</a:t>
+            </a:r>
+            <a:r>
+              <a:rPr lang="en-US" sz="2400" i="1" dirty="0">
+                <a:ln w="0"/>
+                <a:solidFill>
+                  <a:srgbClr val="002060"/>
+                </a:solidFill>
+                <a:effectLst>
+                  <a:outerShdw blurRad="38100" dist="25400" dir="5400000" algn="ctr" rotWithShape="0">
+                    <a:srgbClr val="6E747A">
+                      <a:alpha val="43000"/>
+                    </a:srgbClr>
+                  </a:outerShdw>
+                </a:effectLst>
+              </a:rPr>
+              <a:t>: repeated failed login may indicate an attack, so we can limit access to a particular system after several failed login attempt. The lock-out period must be considered only for a certain period of time, because also legitimate users can make mistakes;</a:t>
+            </a:r>
+          </a:p>
+        </p:txBody>
+      </p:sp>
+      <p:pic>
+        <p:nvPicPr>
+          <p:cNvPr id="3" name="Picture 2">
+            <a:extLst>
+              <a:ext uri="{FF2B5EF4-FFF2-40B4-BE49-F238E27FC236}">
+                <a16:creationId xmlns:a16="http://schemas.microsoft.com/office/drawing/2014/main" id="{CD720C64-1E7F-47F6-8BC3-E2DA197B11AC}"/>
+              </a:ext>
+            </a:extLst>
+          </p:cNvPr>
+          <p:cNvPicPr>
+            <a:picLocks noChangeAspect="1"/>
+          </p:cNvPicPr>
+          <p:nvPr/>
+        </p:nvPicPr>
+        <p:blipFill>
+          <a:blip r:embed="rId4">
+            <a:extLst>
+              <a:ext uri="{28A0092B-C50C-407E-A947-70E740481C1C}">
+                <a14:useLocalDpi xmlns:a14="http://schemas.microsoft.com/office/drawing/2010/main" val="0"/>
+              </a:ext>
+            </a:extLst>
+          </a:blip>
+          <a:stretch>
+            <a:fillRect/>
+          </a:stretch>
+        </p:blipFill>
+        <p:spPr>
+          <a:xfrm>
+            <a:off x="5100614" y="4348009"/>
+            <a:ext cx="1990771" cy="2214061"/>
+          </a:xfrm>
+          <a:prstGeom prst="rect">
+            <a:avLst/>
+          </a:prstGeom>
+        </p:spPr>
+      </p:pic>
+    </p:spTree>
+    <p:extLst>
+      <p:ext uri="{BB962C8B-B14F-4D97-AF65-F5344CB8AC3E}">
+        <p14:creationId xmlns:p14="http://schemas.microsoft.com/office/powerpoint/2010/main" val="3162977591"/>
+      </p:ext>
+    </p:extLst>
+  </p:cSld>
+  <p:clrMapOvr>
+    <a:masterClrMapping/>
+  </p:clrMapOvr>
+</p:sld>
+</file>
+
+<file path=ppt/slides/slide9.xml><?xml version="1.0" encoding="utf-8"?>
+<p:sld xmlns:a="http://schemas.openxmlformats.org/drawingml/2006/main" xmlns:r="http://schemas.openxmlformats.org/officeDocument/2006/relationships" xmlns:p="http://schemas.openxmlformats.org/presentationml/2006/main">
+  <p:cSld>
+    <p:spTree>
+      <p:nvGrpSpPr>
+        <p:cNvPr id="1" name=""/>
+        <p:cNvGrpSpPr/>
+        <p:nvPr/>
+      </p:nvGrpSpPr>
+      <p:grpSpPr>
+        <a:xfrm>
+          <a:off x="0" y="0"/>
+          <a:ext cx="0" cy="0"/>
+          <a:chOff x="0" y="0"/>
+          <a:chExt cx="0" cy="0"/>
+        </a:xfrm>
+      </p:grpSpPr>
+      <p:sp>
+        <p:nvSpPr>
+          <p:cNvPr id="4" name="Segnaposto numero diapositiva 3">
+            <a:extLst>
+              <a:ext uri="{FF2B5EF4-FFF2-40B4-BE49-F238E27FC236}">
+                <a16:creationId xmlns:a16="http://schemas.microsoft.com/office/drawing/2014/main" id="{91E057A0-BAB1-4D57-BDBD-F8F3DE02BEE1}"/>
+              </a:ext>
+            </a:extLst>
+          </p:cNvPr>
+          <p:cNvSpPr>
+            <a:spLocks noGrp="1"/>
+          </p:cNvSpPr>
+          <p:nvPr>
+            <p:ph type="sldNum" sz="quarter" idx="12"/>
+          </p:nvPr>
+        </p:nvSpPr>
+        <p:spPr/>
+        <p:txBody>
+          <a:bodyPr/>
+          <a:lstStyle/>
+          <a:p>
+            <a:fld id="{AFB85319-5DF8-4B17-9881-6D5B2C7AB305}" type="slidenum">
+              <a:rPr lang="it-IT" smtClean="0"/>
+              <a:t>9</a:t>
+            </a:fld>
+            <a:endParaRPr lang="it-IT"/>
+          </a:p>
+        </p:txBody>
+      </p:sp>
+      <p:pic>
+        <p:nvPicPr>
+          <p:cNvPr id="6" name="Immagine 5">
+            <a:extLst>
+              <a:ext uri="{FF2B5EF4-FFF2-40B4-BE49-F238E27FC236}">
+                <a16:creationId xmlns:a16="http://schemas.microsoft.com/office/drawing/2014/main" id="{64DD2710-C925-4AEB-B772-6D532D848EB4}"/>
+              </a:ext>
+            </a:extLst>
+          </p:cNvPr>
+          <p:cNvPicPr>
+            <a:picLocks noChangeAspect="1"/>
+          </p:cNvPicPr>
+          <p:nvPr/>
+        </p:nvPicPr>
+        <p:blipFill rotWithShape="1">
+          <a:blip r:embed="rId2"/>
+          <a:srcRect l="5289" t="10969" r="1423" b="12551"/>
+          <a:stretch/>
+        </p:blipFill>
+        <p:spPr>
+          <a:xfrm>
+            <a:off x="1066800" y="136525"/>
+            <a:ext cx="10058400" cy="1295266"/>
+          </a:xfrm>
+          <a:prstGeom prst="rect">
+            <a:avLst/>
+          </a:prstGeom>
+        </p:spPr>
+      </p:pic>
+      <p:sp>
+        <p:nvSpPr>
+          <p:cNvPr id="8" name="CasellaDiTesto 7">
+            <a:extLst>
+              <a:ext uri="{FF2B5EF4-FFF2-40B4-BE49-F238E27FC236}">
+                <a16:creationId xmlns:a16="http://schemas.microsoft.com/office/drawing/2014/main" id="{3E0E40B7-DD25-4779-A260-DCF2A62C4B41}"/>
+              </a:ext>
+            </a:extLst>
+          </p:cNvPr>
+          <p:cNvSpPr txBox="1"/>
+          <p:nvPr/>
+        </p:nvSpPr>
+        <p:spPr>
+          <a:xfrm>
+            <a:off x="2413592" y="677393"/>
+            <a:ext cx="7490512" cy="584775"/>
+          </a:xfrm>
+          <a:prstGeom prst="rect">
+            <a:avLst/>
+          </a:prstGeom>
+          <a:noFill/>
+        </p:spPr>
+        <p:txBody>
+          <a:bodyPr wrap="none" rtlCol="0">
+            <a:spAutoFit/>
+          </a:bodyPr>
+          <a:lstStyle>
+            <a:defPPr>
+              <a:defRPr lang="it-IT"/>
+            </a:defPPr>
+            <a:lvl1pPr>
+              <a:defRPr sz="4800">
+                <a:ln w="0"/>
+                <a:solidFill>
+                  <a:srgbClr val="002060"/>
+                </a:solidFill>
+                <a:effectLst>
+                  <a:outerShdw blurRad="38100" dist="25400" dir="5400000" algn="ctr" rotWithShape="0">
+                    <a:srgbClr val="6E747A">
+                      <a:alpha val="43000"/>
+                    </a:srgbClr>
+                  </a:outerShdw>
+                </a:effectLst>
+              </a:defRPr>
+            </a:lvl1pPr>
+          </a:lstStyle>
+          <a:p>
+            <a:r>
+              <a:rPr lang="en-US" sz="3200" i="1" dirty="0"/>
+              <a:t>Categories of Tactics – Recover from Attacks</a:t>
+            </a:r>
+            <a:endParaRPr lang="it-IT" sz="3200" i="1" dirty="0"/>
+          </a:p>
+        </p:txBody>
+      </p:sp>
+      <p:pic>
+        <p:nvPicPr>
+          <p:cNvPr id="9" name="Picture 2" descr="Università degli Studi di Milano-Bicocca - Wikipedia">
+            <a:extLst>
+              <a:ext uri="{FF2B5EF4-FFF2-40B4-BE49-F238E27FC236}">
+                <a16:creationId xmlns:a16="http://schemas.microsoft.com/office/drawing/2014/main" id="{9D1896BC-6EF3-43D9-B8A2-217137CA9550}"/>
+              </a:ext>
+            </a:extLst>
+          </p:cNvPr>
+          <p:cNvPicPr>
+            <a:picLocks noChangeAspect="1" noChangeArrowheads="1"/>
+          </p:cNvPicPr>
+          <p:nvPr/>
+        </p:nvPicPr>
+        <p:blipFill>
+          <a:blip r:embed="rId3">
+            <a:extLst>
+              <a:ext uri="{28A0092B-C50C-407E-A947-70E740481C1C}">
+                <a14:useLocalDpi xmlns:a14="http://schemas.microsoft.com/office/drawing/2010/main" val="0"/>
+              </a:ext>
+            </a:extLst>
+          </a:blip>
+          <a:srcRect/>
+          <a:stretch>
+            <a:fillRect/>
+          </a:stretch>
+        </p:blipFill>
+        <p:spPr bwMode="auto">
+          <a:xfrm>
+            <a:off x="1066800" y="160156"/>
+            <a:ext cx="1346792" cy="1331078"/>
+          </a:xfrm>
+          <a:prstGeom prst="rect">
+            <a:avLst/>
+          </a:prstGeom>
+          <a:noFill/>
+          <a:extLst>
+            <a:ext uri="{909E8E84-426E-40DD-AFC4-6F175D3DCCD1}">
+              <a14:hiddenFill xmlns:a14="http://schemas.microsoft.com/office/drawing/2010/main">
+                <a:solidFill>
+                  <a:srgbClr val="FFFFFF"/>
+                </a:solidFill>
+              </a14:hiddenFill>
+            </a:ext>
+          </a:extLst>
+        </p:spPr>
+      </p:pic>
+      <p:sp>
+        <p:nvSpPr>
+          <p:cNvPr id="12" name="CasellaDiTesto 11">
+            <a:extLst>
+              <a:ext uri="{FF2B5EF4-FFF2-40B4-BE49-F238E27FC236}">
+                <a16:creationId xmlns:a16="http://schemas.microsoft.com/office/drawing/2014/main" id="{571AD994-D4E1-4A5F-AC61-FAE189DB693F}"/>
+              </a:ext>
+            </a:extLst>
+          </p:cNvPr>
+          <p:cNvSpPr txBox="1"/>
+          <p:nvPr/>
+        </p:nvSpPr>
+        <p:spPr>
+          <a:xfrm>
+            <a:off x="683925" y="2555242"/>
+            <a:ext cx="5673890" cy="461665"/>
+          </a:xfrm>
+          <a:prstGeom prst="rect">
+            <a:avLst/>
+          </a:prstGeom>
+          <a:noFill/>
+        </p:spPr>
+        <p:txBody>
+          <a:bodyPr wrap="square" rtlCol="0">
+            <a:spAutoFit/>
+          </a:bodyPr>
+          <a:lstStyle/>
+          <a:p>
+            <a:pPr marL="457200" indent="-457200" algn="just">
+              <a:buFont typeface="Arial" panose="020B0604020202020204" pitchFamily="34" charset="0"/>
+              <a:buChar char="•"/>
+            </a:pPr>
+            <a:endParaRPr lang="en-US" sz="2400" i="1" dirty="0">
+              <a:ln w="0"/>
               <a:solidFill>
                 <a:srgbClr val="002060"/>
               </a:solidFill>
+              <a:effectLst>
+                <a:outerShdw blurRad="38100" dist="25400" dir="5400000" algn="ctr" rotWithShape="0">
+                  <a:srgbClr val="6E747A">
+                    <a:alpha val="43000"/>
+                  </a:srgbClr>
+                </a:outerShdw>
+              </a:effectLst>
             </a:endParaRPr>
           </a:p>
         </p:txBody>
       </p:sp>
+      <p:sp>
+        <p:nvSpPr>
+          <p:cNvPr id="10" name="CasellaDiTesto 11">
+            <a:extLst>
+              <a:ext uri="{FF2B5EF4-FFF2-40B4-BE49-F238E27FC236}">
+                <a16:creationId xmlns:a16="http://schemas.microsoft.com/office/drawing/2014/main" id="{3C86721B-FE1B-4CA9-ADAF-445A69630E19}"/>
+              </a:ext>
+            </a:extLst>
+          </p:cNvPr>
+          <p:cNvSpPr txBox="1"/>
+          <p:nvPr/>
+        </p:nvSpPr>
+        <p:spPr>
+          <a:xfrm>
+            <a:off x="1066801" y="1653933"/>
+            <a:ext cx="10058399" cy="2308324"/>
+          </a:xfrm>
+          <a:prstGeom prst="rect">
+            <a:avLst/>
+          </a:prstGeom>
+          <a:noFill/>
+        </p:spPr>
+        <p:txBody>
+          <a:bodyPr wrap="square" rtlCol="0">
+            <a:spAutoFit/>
+          </a:bodyPr>
+          <a:lstStyle/>
+          <a:p>
+            <a:pPr marL="457200" indent="-457200" algn="just">
+              <a:buFont typeface="Arial" panose="020B0604020202020204" pitchFamily="34" charset="0"/>
+              <a:buChar char="•"/>
+            </a:pPr>
+            <a:r>
+              <a:rPr lang="en-US" sz="2400" b="1" i="1" dirty="0">
+                <a:ln w="0"/>
+                <a:solidFill>
+                  <a:srgbClr val="002060"/>
+                </a:solidFill>
+                <a:effectLst>
+                  <a:outerShdw blurRad="38100" dist="25400" dir="5400000" algn="ctr" rotWithShape="0">
+                    <a:srgbClr val="6E747A">
+                      <a:alpha val="43000"/>
+                    </a:srgbClr>
+                  </a:outerShdw>
+                </a:effectLst>
+              </a:rPr>
+              <a:t>Audit</a:t>
+            </a:r>
+            <a:r>
+              <a:rPr lang="en-US" sz="2400" i="1" dirty="0">
+                <a:ln w="0"/>
+                <a:solidFill>
+                  <a:srgbClr val="002060"/>
+                </a:solidFill>
+                <a:effectLst>
+                  <a:outerShdw blurRad="38100" dist="25400" dir="5400000" algn="ctr" rotWithShape="0">
+                    <a:srgbClr val="6E747A">
+                      <a:alpha val="43000"/>
+                    </a:srgbClr>
+                  </a:outerShdw>
+                </a:effectLst>
+              </a:rPr>
+              <a:t>: keep a record of user, system actions and their effects, to help trace all actions, and in case, identify an attacker. We can also analyze audit to see attack pattern, and create better defenses for future;</a:t>
+            </a:r>
+          </a:p>
+          <a:p>
+            <a:pPr marL="457200" indent="-457200" algn="just">
+              <a:buFont typeface="Arial" panose="020B0604020202020204" pitchFamily="34" charset="0"/>
+              <a:buChar char="•"/>
+            </a:pPr>
+            <a:r>
+              <a:rPr lang="en-US" sz="2400" b="1" i="1" dirty="0">
+                <a:ln w="0"/>
+                <a:solidFill>
+                  <a:srgbClr val="002060"/>
+                </a:solidFill>
+                <a:effectLst>
+                  <a:outerShdw blurRad="38100" dist="25400" dir="5400000" algn="ctr" rotWithShape="0">
+                    <a:srgbClr val="6E747A">
+                      <a:alpha val="43000"/>
+                    </a:srgbClr>
+                  </a:outerShdw>
+                </a:effectLst>
+              </a:rPr>
+              <a:t>Non Repudiation</a:t>
+            </a:r>
+            <a:r>
+              <a:rPr lang="en-US" sz="2400" i="1" dirty="0">
+                <a:ln w="0"/>
+                <a:solidFill>
+                  <a:srgbClr val="002060"/>
+                </a:solidFill>
+                <a:effectLst>
+                  <a:outerShdw blurRad="38100" dist="25400" dir="5400000" algn="ctr" rotWithShape="0">
+                    <a:srgbClr val="6E747A">
+                      <a:alpha val="43000"/>
+                    </a:srgbClr>
+                  </a:outerShdw>
+                </a:effectLst>
+              </a:rPr>
+              <a:t>: guarantees that the sender of a message cannot deny the send of that message, and same of the receiver. This could be achieved with combination of digital signature and authentication by trusted parties;</a:t>
+            </a:r>
+          </a:p>
+        </p:txBody>
+      </p:sp>
+      <p:pic>
+        <p:nvPicPr>
+          <p:cNvPr id="5" name="Picture 4">
+            <a:extLst>
+              <a:ext uri="{FF2B5EF4-FFF2-40B4-BE49-F238E27FC236}">
+                <a16:creationId xmlns:a16="http://schemas.microsoft.com/office/drawing/2014/main" id="{C147262A-1DFA-4781-930A-FA2D283EA13D}"/>
+              </a:ext>
+            </a:extLst>
+          </p:cNvPr>
+          <p:cNvPicPr>
+            <a:picLocks noChangeAspect="1"/>
+          </p:cNvPicPr>
+          <p:nvPr/>
+        </p:nvPicPr>
+        <p:blipFill>
+          <a:blip r:embed="rId4">
+            <a:extLst>
+              <a:ext uri="{28A0092B-C50C-407E-A947-70E740481C1C}">
+                <a14:useLocalDpi xmlns:a14="http://schemas.microsoft.com/office/drawing/2010/main" val="0"/>
+              </a:ext>
+            </a:extLst>
+          </a:blip>
+          <a:stretch>
+            <a:fillRect/>
+          </a:stretch>
+        </p:blipFill>
+        <p:spPr>
+          <a:xfrm>
+            <a:off x="4724400" y="3962257"/>
+            <a:ext cx="2743200" cy="2743200"/>
+          </a:xfrm>
+          <a:prstGeom prst="rect">
+            <a:avLst/>
+          </a:prstGeom>
+        </p:spPr>
+      </p:pic>
     </p:spTree>
     <p:extLst>
       <p:ext uri="{BB962C8B-B14F-4D97-AF65-F5344CB8AC3E}">
-        <p14:creationId xmlns:p14="http://schemas.microsoft.com/office/powerpoint/2010/main" val="603346053"/>
+        <p14:creationId xmlns:p14="http://schemas.microsoft.com/office/powerpoint/2010/main" val="2149927018"/>
       </p:ext>
     </p:extLst>
   </p:cSld>

</xml_diff>